<commit_message>
Final Pertemuan 4 : Perulangan Teks Book & Slide (Latihan Teori /  Catatan :  Latihan Praktek Belum
</commit_message>
<xml_diff>
--- a/Presentasi/Pertemuan 4 Perulangan (Looping).pptx
+++ b/Presentasi/Pertemuan 4 Perulangan (Looping).pptx
@@ -5,7 +5,7 @@
     <p:sldMasterId id="2147483648" r:id="rId1"/>
   </p:sldMasterIdLst>
   <p:notesMasterIdLst>
-    <p:notesMasterId r:id="rId29"/>
+    <p:notesMasterId r:id="rId35"/>
   </p:notesMasterIdLst>
   <p:sldIdLst>
     <p:sldId id="256" r:id="rId2"/>
@@ -34,7 +34,13 @@
     <p:sldId id="278" r:id="rId25"/>
     <p:sldId id="279" r:id="rId26"/>
     <p:sldId id="281" r:id="rId27"/>
-    <p:sldId id="282" r:id="rId28"/>
+    <p:sldId id="283" r:id="rId28"/>
+    <p:sldId id="284" r:id="rId29"/>
+    <p:sldId id="282" r:id="rId30"/>
+    <p:sldId id="285" r:id="rId31"/>
+    <p:sldId id="286" r:id="rId32"/>
+    <p:sldId id="287" r:id="rId33"/>
+    <p:sldId id="288" r:id="rId34"/>
   </p:sldIdLst>
   <p:sldSz cx="9144000" cy="6858000" type="screen4x3"/>
   <p:notesSz cx="6858000" cy="9144000"/>
@@ -218,7 +224,8 @@
           <a:p>
             <a:fld id="{4B2B8F94-9F64-4C32-9EE5-2C881C0B4A23}" type="datetimeFigureOut">
               <a:rPr lang="id-ID" smtClean="0"/>
-              <a:t>05/09/2014</a:t>
+              <a:pPr/>
+              <a:t>08/09/2014</a:t>
             </a:fld>
             <a:endParaRPr lang="id-ID"/>
           </a:p>
@@ -379,6 +386,7 @@
           <a:p>
             <a:fld id="{DF75BF73-A417-4FEA-BF3D-9FF612C63A3C}" type="slidenum">
               <a:rPr lang="id-ID" smtClean="0"/>
+              <a:pPr/>
               <a:t>‹#›</a:t>
             </a:fld>
             <a:endParaRPr lang="id-ID"/>
@@ -550,6 +558,7 @@
           <a:p>
             <a:fld id="{DF75BF73-A417-4FEA-BF3D-9FF612C63A3C}" type="slidenum">
               <a:rPr lang="id-ID" smtClean="0"/>
+              <a:pPr/>
               <a:t>1</a:t>
             </a:fld>
             <a:endParaRPr lang="id-ID"/>
@@ -631,6 +640,7 @@
           <a:p>
             <a:fld id="{DF75BF73-A417-4FEA-BF3D-9FF612C63A3C}" type="slidenum">
               <a:rPr lang="id-ID" smtClean="0"/>
+              <a:pPr/>
               <a:t>15</a:t>
             </a:fld>
             <a:endParaRPr lang="id-ID"/>
@@ -826,7 +836,8 @@
           <a:p>
             <a:fld id="{57BD96D6-C18B-437E-98C8-CCC93CF4B087}" type="datetimeFigureOut">
               <a:rPr lang="id-ID" smtClean="0"/>
-              <a:t>05/09/2014</a:t>
+              <a:pPr/>
+              <a:t>08/09/2014</a:t>
             </a:fld>
             <a:endParaRPr lang="id-ID"/>
           </a:p>
@@ -868,6 +879,7 @@
           <a:p>
             <a:fld id="{AE259792-B678-4DD0-9DD3-E772791CD2CD}" type="slidenum">
               <a:rPr lang="id-ID" smtClean="0"/>
+              <a:pPr/>
               <a:t>‹#›</a:t>
             </a:fld>
             <a:endParaRPr lang="id-ID"/>
@@ -991,7 +1003,8 @@
           <a:p>
             <a:fld id="{57BD96D6-C18B-437E-98C8-CCC93CF4B087}" type="datetimeFigureOut">
               <a:rPr lang="id-ID" smtClean="0"/>
-              <a:t>05/09/2014</a:t>
+              <a:pPr/>
+              <a:t>08/09/2014</a:t>
             </a:fld>
             <a:endParaRPr lang="id-ID"/>
           </a:p>
@@ -1033,6 +1046,7 @@
           <a:p>
             <a:fld id="{AE259792-B678-4DD0-9DD3-E772791CD2CD}" type="slidenum">
               <a:rPr lang="id-ID" smtClean="0"/>
+              <a:pPr/>
               <a:t>‹#›</a:t>
             </a:fld>
             <a:endParaRPr lang="id-ID"/>
@@ -1166,7 +1180,8 @@
           <a:p>
             <a:fld id="{57BD96D6-C18B-437E-98C8-CCC93CF4B087}" type="datetimeFigureOut">
               <a:rPr lang="id-ID" smtClean="0"/>
-              <a:t>05/09/2014</a:t>
+              <a:pPr/>
+              <a:t>08/09/2014</a:t>
             </a:fld>
             <a:endParaRPr lang="id-ID"/>
           </a:p>
@@ -1208,6 +1223,7 @@
           <a:p>
             <a:fld id="{AE259792-B678-4DD0-9DD3-E772791CD2CD}" type="slidenum">
               <a:rPr lang="id-ID" smtClean="0"/>
+              <a:pPr/>
               <a:t>‹#›</a:t>
             </a:fld>
             <a:endParaRPr lang="id-ID"/>
@@ -1331,7 +1347,8 @@
           <a:p>
             <a:fld id="{57BD96D6-C18B-437E-98C8-CCC93CF4B087}" type="datetimeFigureOut">
               <a:rPr lang="id-ID" smtClean="0"/>
-              <a:t>05/09/2014</a:t>
+              <a:pPr/>
+              <a:t>08/09/2014</a:t>
             </a:fld>
             <a:endParaRPr lang="id-ID"/>
           </a:p>
@@ -1373,6 +1390,7 @@
           <a:p>
             <a:fld id="{AE259792-B678-4DD0-9DD3-E772791CD2CD}" type="slidenum">
               <a:rPr lang="id-ID" smtClean="0"/>
+              <a:pPr/>
               <a:t>‹#›</a:t>
             </a:fld>
             <a:endParaRPr lang="id-ID"/>
@@ -1572,7 +1590,8 @@
           <a:p>
             <a:fld id="{57BD96D6-C18B-437E-98C8-CCC93CF4B087}" type="datetimeFigureOut">
               <a:rPr lang="id-ID" smtClean="0"/>
-              <a:t>05/09/2014</a:t>
+              <a:pPr/>
+              <a:t>08/09/2014</a:t>
             </a:fld>
             <a:endParaRPr lang="id-ID"/>
           </a:p>
@@ -1614,6 +1633,7 @@
           <a:p>
             <a:fld id="{AE259792-B678-4DD0-9DD3-E772791CD2CD}" type="slidenum">
               <a:rPr lang="id-ID" smtClean="0"/>
+              <a:pPr/>
               <a:t>‹#›</a:t>
             </a:fld>
             <a:endParaRPr lang="id-ID"/>
@@ -1855,7 +1875,8 @@
           <a:p>
             <a:fld id="{57BD96D6-C18B-437E-98C8-CCC93CF4B087}" type="datetimeFigureOut">
               <a:rPr lang="id-ID" smtClean="0"/>
-              <a:t>05/09/2014</a:t>
+              <a:pPr/>
+              <a:t>08/09/2014</a:t>
             </a:fld>
             <a:endParaRPr lang="id-ID"/>
           </a:p>
@@ -1897,6 +1918,7 @@
           <a:p>
             <a:fld id="{AE259792-B678-4DD0-9DD3-E772791CD2CD}" type="slidenum">
               <a:rPr lang="id-ID" smtClean="0"/>
+              <a:pPr/>
               <a:t>‹#›</a:t>
             </a:fld>
             <a:endParaRPr lang="id-ID"/>
@@ -2272,7 +2294,8 @@
           <a:p>
             <a:fld id="{57BD96D6-C18B-437E-98C8-CCC93CF4B087}" type="datetimeFigureOut">
               <a:rPr lang="id-ID" smtClean="0"/>
-              <a:t>05/09/2014</a:t>
+              <a:pPr/>
+              <a:t>08/09/2014</a:t>
             </a:fld>
             <a:endParaRPr lang="id-ID"/>
           </a:p>
@@ -2314,6 +2337,7 @@
           <a:p>
             <a:fld id="{AE259792-B678-4DD0-9DD3-E772791CD2CD}" type="slidenum">
               <a:rPr lang="id-ID" smtClean="0"/>
+              <a:pPr/>
               <a:t>‹#›</a:t>
             </a:fld>
             <a:endParaRPr lang="id-ID"/>
@@ -2385,7 +2409,8 @@
           <a:p>
             <a:fld id="{57BD96D6-C18B-437E-98C8-CCC93CF4B087}" type="datetimeFigureOut">
               <a:rPr lang="id-ID" smtClean="0"/>
-              <a:t>05/09/2014</a:t>
+              <a:pPr/>
+              <a:t>08/09/2014</a:t>
             </a:fld>
             <a:endParaRPr lang="id-ID"/>
           </a:p>
@@ -2427,6 +2452,7 @@
           <a:p>
             <a:fld id="{AE259792-B678-4DD0-9DD3-E772791CD2CD}" type="slidenum">
               <a:rPr lang="id-ID" smtClean="0"/>
+              <a:pPr/>
               <a:t>‹#›</a:t>
             </a:fld>
             <a:endParaRPr lang="id-ID"/>
@@ -2475,7 +2501,8 @@
           <a:p>
             <a:fld id="{57BD96D6-C18B-437E-98C8-CCC93CF4B087}" type="datetimeFigureOut">
               <a:rPr lang="id-ID" smtClean="0"/>
-              <a:t>05/09/2014</a:t>
+              <a:pPr/>
+              <a:t>08/09/2014</a:t>
             </a:fld>
             <a:endParaRPr lang="id-ID"/>
           </a:p>
@@ -2517,6 +2544,7 @@
           <a:p>
             <a:fld id="{AE259792-B678-4DD0-9DD3-E772791CD2CD}" type="slidenum">
               <a:rPr lang="id-ID" smtClean="0"/>
+              <a:pPr/>
               <a:t>‹#›</a:t>
             </a:fld>
             <a:endParaRPr lang="id-ID"/>
@@ -2747,7 +2775,8 @@
           <a:p>
             <a:fld id="{57BD96D6-C18B-437E-98C8-CCC93CF4B087}" type="datetimeFigureOut">
               <a:rPr lang="id-ID" smtClean="0"/>
-              <a:t>05/09/2014</a:t>
+              <a:pPr/>
+              <a:t>08/09/2014</a:t>
             </a:fld>
             <a:endParaRPr lang="id-ID"/>
           </a:p>
@@ -2789,6 +2818,7 @@
           <a:p>
             <a:fld id="{AE259792-B678-4DD0-9DD3-E772791CD2CD}" type="slidenum">
               <a:rPr lang="id-ID" smtClean="0"/>
+              <a:pPr/>
               <a:t>‹#›</a:t>
             </a:fld>
             <a:endParaRPr lang="id-ID"/>
@@ -2995,7 +3025,8 @@
           <a:p>
             <a:fld id="{57BD96D6-C18B-437E-98C8-CCC93CF4B087}" type="datetimeFigureOut">
               <a:rPr lang="id-ID" smtClean="0"/>
-              <a:t>05/09/2014</a:t>
+              <a:pPr/>
+              <a:t>08/09/2014</a:t>
             </a:fld>
             <a:endParaRPr lang="id-ID"/>
           </a:p>
@@ -3037,6 +3068,7 @@
           <a:p>
             <a:fld id="{AE259792-B678-4DD0-9DD3-E772791CD2CD}" type="slidenum">
               <a:rPr lang="id-ID" smtClean="0"/>
+              <a:pPr/>
               <a:t>‹#›</a:t>
             </a:fld>
             <a:endParaRPr lang="id-ID"/>
@@ -3266,7 +3298,8 @@
           <a:p>
             <a:fld id="{57BD96D6-C18B-437E-98C8-CCC93CF4B087}" type="datetimeFigureOut">
               <a:rPr lang="id-ID" smtClean="0"/>
-              <a:t>05/09/2014</a:t>
+              <a:pPr/>
+              <a:t>08/09/2014</a:t>
             </a:fld>
             <a:endParaRPr lang="id-ID"/>
           </a:p>
@@ -3344,6 +3377,7 @@
           <a:p>
             <a:fld id="{AE259792-B678-4DD0-9DD3-E772791CD2CD}" type="slidenum">
               <a:rPr lang="id-ID" smtClean="0"/>
+              <a:pPr/>
               <a:t>‹#›</a:t>
             </a:fld>
             <a:endParaRPr lang="id-ID"/>
@@ -4829,7 +4863,10 @@
               </a:rPr>
               <a:t>Implementasi Perulangan</a:t>
             </a:r>
-            <a:endParaRPr lang="id-ID"/>
+            <a:endParaRPr lang="id-ID">
+              <a:latin typeface="Times New Roman" pitchFamily="18" charset="0"/>
+              <a:cs typeface="Times New Roman" pitchFamily="18" charset="0"/>
+            </a:endParaRPr>
           </a:p>
         </p:txBody>
       </p:sp>
@@ -4849,17 +4886,29 @@
           <a:lstStyle/>
           <a:p>
             <a:r>
-              <a:rPr lang="id-ID" smtClean="0"/>
+              <a:rPr lang="id-ID" smtClean="0">
+                <a:latin typeface="Times New Roman" pitchFamily="18" charset="0"/>
+                <a:cs typeface="Times New Roman" pitchFamily="18" charset="0"/>
+              </a:rPr>
               <a:t>Perulangan sering digunakan terhadap tipe-data jamak, misalnya : array, list, string, dan tipe-data jamak lainnya.</a:t>
             </a:r>
-            <a:endParaRPr lang="id-ID"/>
-          </a:p>
-          <a:p>
-            <a:r>
-              <a:rPr lang="id-ID" smtClean="0"/>
+            <a:endParaRPr lang="id-ID">
+              <a:latin typeface="Times New Roman" pitchFamily="18" charset="0"/>
+              <a:cs typeface="Times New Roman" pitchFamily="18" charset="0"/>
+            </a:endParaRPr>
+          </a:p>
+          <a:p>
+            <a:r>
+              <a:rPr lang="id-ID" smtClean="0">
+                <a:latin typeface="Times New Roman" pitchFamily="18" charset="0"/>
+                <a:cs typeface="Times New Roman" pitchFamily="18" charset="0"/>
+              </a:rPr>
               <a:t>Array adalah kumpulan data tunggal dalam satu variabel</a:t>
             </a:r>
-            <a:endParaRPr lang="id-ID"/>
+            <a:endParaRPr lang="id-ID">
+              <a:latin typeface="Times New Roman" pitchFamily="18" charset="0"/>
+              <a:cs typeface="Times New Roman" pitchFamily="18" charset="0"/>
+            </a:endParaRPr>
           </a:p>
         </p:txBody>
       </p:sp>
@@ -5045,10 +5094,16 @@
           <a:lstStyle/>
           <a:p>
             <a:r>
-              <a:rPr lang="id-ID" smtClean="0"/>
+              <a:rPr lang="id-ID" smtClean="0">
+                <a:latin typeface="Times New Roman" pitchFamily="18" charset="0"/>
+                <a:cs typeface="Times New Roman" pitchFamily="18" charset="0"/>
+              </a:rPr>
               <a:t>Array</a:t>
             </a:r>
-            <a:endParaRPr lang="id-ID"/>
+            <a:endParaRPr lang="id-ID">
+              <a:latin typeface="Times New Roman" pitchFamily="18" charset="0"/>
+              <a:cs typeface="Times New Roman" pitchFamily="18" charset="0"/>
+            </a:endParaRPr>
           </a:p>
         </p:txBody>
       </p:sp>
@@ -5153,7 +5208,10 @@
               </a:rPr>
               <a:t>Array dan Perulangan</a:t>
             </a:r>
-            <a:endParaRPr lang="id-ID"/>
+            <a:endParaRPr lang="id-ID">
+              <a:latin typeface="Times New Roman" pitchFamily="18" charset="0"/>
+              <a:cs typeface="Times New Roman" pitchFamily="18" charset="0"/>
+            </a:endParaRPr>
           </a:p>
         </p:txBody>
       </p:sp>
@@ -5258,7 +5316,10 @@
               </a:rPr>
               <a:t>Array dan Perulangan</a:t>
             </a:r>
-            <a:endParaRPr lang="id-ID"/>
+            <a:endParaRPr lang="id-ID">
+              <a:latin typeface="Times New Roman" pitchFamily="18" charset="0"/>
+              <a:cs typeface="Times New Roman" pitchFamily="18" charset="0"/>
+            </a:endParaRPr>
           </a:p>
         </p:txBody>
       </p:sp>
@@ -5357,10 +5418,16 @@
           <a:lstStyle/>
           <a:p>
             <a:r>
-              <a:rPr lang="id-ID" smtClean="0"/>
+              <a:rPr lang="id-ID" smtClean="0">
+                <a:latin typeface="Times New Roman" pitchFamily="18" charset="0"/>
+                <a:cs typeface="Times New Roman" pitchFamily="18" charset="0"/>
+              </a:rPr>
               <a:t>String</a:t>
             </a:r>
-            <a:endParaRPr lang="id-ID"/>
+            <a:endParaRPr lang="id-ID">
+              <a:latin typeface="Times New Roman" pitchFamily="18" charset="0"/>
+              <a:cs typeface="Times New Roman" pitchFamily="18" charset="0"/>
+            </a:endParaRPr>
           </a:p>
         </p:txBody>
       </p:sp>
@@ -5380,19 +5447,31 @@
           <a:lstStyle/>
           <a:p>
             <a:r>
-              <a:rPr lang="id-ID" smtClean="0"/>
+              <a:rPr lang="id-ID" smtClean="0">
+                <a:latin typeface="Times New Roman" pitchFamily="18" charset="0"/>
+                <a:cs typeface="Times New Roman" pitchFamily="18" charset="0"/>
+              </a:rPr>
               <a:t>String adalah Array of Character</a:t>
             </a:r>
           </a:p>
           <a:p>
-            <a:endParaRPr lang="id-ID"/>
-          </a:p>
-          <a:p>
-            <a:r>
-              <a:rPr lang="id-ID" smtClean="0"/>
+            <a:endParaRPr lang="id-ID">
+              <a:latin typeface="Times New Roman" pitchFamily="18" charset="0"/>
+              <a:cs typeface="Times New Roman" pitchFamily="18" charset="0"/>
+            </a:endParaRPr>
+          </a:p>
+          <a:p>
+            <a:r>
+              <a:rPr lang="id-ID" smtClean="0">
+                <a:latin typeface="Times New Roman" pitchFamily="18" charset="0"/>
+                <a:cs typeface="Times New Roman" pitchFamily="18" charset="0"/>
+              </a:rPr>
               <a:t>Kita dapat mengakses character(melalui indeks) dari String sama seperti kita mengakses Bilangan Bulat / Objek apapun pada Array</a:t>
             </a:r>
-            <a:endParaRPr lang="id-ID"/>
+            <a:endParaRPr lang="id-ID">
+              <a:latin typeface="Times New Roman" pitchFamily="18" charset="0"/>
+              <a:cs typeface="Times New Roman" pitchFamily="18" charset="0"/>
+            </a:endParaRPr>
           </a:p>
         </p:txBody>
       </p:sp>
@@ -5558,7 +5637,10 @@
               </a:rPr>
               <a:t>String  dan Perulangan</a:t>
             </a:r>
-            <a:endParaRPr lang="id-ID"/>
+            <a:endParaRPr lang="id-ID">
+              <a:latin typeface="Times New Roman" pitchFamily="18" charset="0"/>
+              <a:cs typeface="Times New Roman" pitchFamily="18" charset="0"/>
+            </a:endParaRPr>
           </a:p>
         </p:txBody>
       </p:sp>
@@ -5754,9 +5836,175 @@
         </p:nvSpPr>
         <p:spPr/>
         <p:txBody>
-          <a:bodyPr/>
-          <a:lstStyle/>
-          <a:p>
+          <a:bodyPr>
+            <a:normAutofit lnSpcReduction="10000"/>
+          </a:bodyPr>
+          <a:lstStyle/>
+          <a:p>
+            <a:pPr>
+              <a:buNone/>
+            </a:pPr>
+            <a:r>
+              <a:rPr lang="id-ID" smtClean="0">
+                <a:latin typeface="Times New Roman" pitchFamily="18" charset="0"/>
+                <a:cs typeface="Times New Roman" pitchFamily="18" charset="0"/>
+              </a:rPr>
+              <a:t>Sebuah perulangan dapat memiliki perulangan di </a:t>
+            </a:r>
+            <a:r>
+              <a:rPr lang="id-ID" smtClean="0">
+                <a:latin typeface="Times New Roman" pitchFamily="18" charset="0"/>
+                <a:cs typeface="Times New Roman" pitchFamily="18" charset="0"/>
+              </a:rPr>
+              <a:t>dalamnya </a:t>
+            </a:r>
+            <a:r>
+              <a:rPr lang="id-ID" smtClean="0">
+                <a:latin typeface="Times New Roman" pitchFamily="18" charset="0"/>
+                <a:cs typeface="Times New Roman" pitchFamily="18" charset="0"/>
+              </a:rPr>
+              <a:t>dan perulangan </a:t>
+            </a:r>
+            <a:r>
+              <a:rPr lang="id-ID" smtClean="0">
+                <a:latin typeface="Times New Roman" pitchFamily="18" charset="0"/>
+                <a:cs typeface="Times New Roman" pitchFamily="18" charset="0"/>
+              </a:rPr>
+              <a:t>yang di dalam tersebut juga dapat juga </a:t>
+            </a:r>
+            <a:r>
+              <a:rPr lang="id-ID" smtClean="0">
+                <a:latin typeface="Times New Roman" pitchFamily="18" charset="0"/>
+                <a:cs typeface="Times New Roman" pitchFamily="18" charset="0"/>
+              </a:rPr>
+              <a:t>dapat </a:t>
+            </a:r>
+            <a:r>
+              <a:rPr lang="id-ID" smtClean="0">
+                <a:latin typeface="Times New Roman" pitchFamily="18" charset="0"/>
+                <a:cs typeface="Times New Roman" pitchFamily="18" charset="0"/>
+              </a:rPr>
+              <a:t>memiliki perulangan </a:t>
+            </a:r>
+            <a:r>
+              <a:rPr lang="id-ID" smtClean="0">
+                <a:latin typeface="Times New Roman" pitchFamily="18" charset="0"/>
+                <a:cs typeface="Times New Roman" pitchFamily="18" charset="0"/>
+              </a:rPr>
+              <a:t>lainnya di dalam. Perulangan yang </a:t>
+            </a:r>
+            <a:r>
+              <a:rPr lang="id-ID" smtClean="0">
+                <a:latin typeface="Times New Roman" pitchFamily="18" charset="0"/>
+                <a:cs typeface="Times New Roman" pitchFamily="18" charset="0"/>
+              </a:rPr>
+              <a:t>di </a:t>
+            </a:r>
+            <a:r>
+              <a:rPr lang="id-ID" smtClean="0">
+                <a:latin typeface="Times New Roman" pitchFamily="18" charset="0"/>
+                <a:cs typeface="Times New Roman" pitchFamily="18" charset="0"/>
+              </a:rPr>
+              <a:t>dalam tersebut tidaklah </a:t>
+            </a:r>
+            <a:r>
+              <a:rPr lang="id-ID" smtClean="0">
+                <a:latin typeface="Times New Roman" pitchFamily="18" charset="0"/>
+                <a:cs typeface="Times New Roman" pitchFamily="18" charset="0"/>
+              </a:rPr>
+              <a:t>harus menggunakan statement yang sama </a:t>
+            </a:r>
+            <a:r>
+              <a:rPr lang="id-ID" smtClean="0">
+                <a:latin typeface="Times New Roman" pitchFamily="18" charset="0"/>
+                <a:cs typeface="Times New Roman" pitchFamily="18" charset="0"/>
+              </a:rPr>
+              <a:t>dengan </a:t>
+            </a:r>
+            <a:r>
+              <a:rPr lang="id-ID" smtClean="0">
+                <a:latin typeface="Times New Roman" pitchFamily="18" charset="0"/>
+                <a:cs typeface="Times New Roman" pitchFamily="18" charset="0"/>
+              </a:rPr>
+              <a:t>perulangan </a:t>
+            </a:r>
+            <a:r>
+              <a:rPr lang="sv-SE" smtClean="0">
+                <a:latin typeface="Times New Roman" pitchFamily="18" charset="0"/>
+                <a:cs typeface="Times New Roman" pitchFamily="18" charset="0"/>
+              </a:rPr>
+              <a:t>induknya</a:t>
+            </a:r>
+            <a:r>
+              <a:rPr lang="sv-SE" smtClean="0">
+                <a:latin typeface="Times New Roman" pitchFamily="18" charset="0"/>
+                <a:cs typeface="Times New Roman" pitchFamily="18" charset="0"/>
+              </a:rPr>
+              <a:t>. Misalnya, boleh saja </a:t>
+            </a:r>
+            <a:r>
+              <a:rPr lang="sv-SE" smtClean="0">
+                <a:latin typeface="Times New Roman" pitchFamily="18" charset="0"/>
+                <a:cs typeface="Times New Roman" pitchFamily="18" charset="0"/>
+              </a:rPr>
+              <a:t>kita </a:t>
+            </a:r>
+            <a:r>
+              <a:rPr lang="id-ID" smtClean="0">
+                <a:latin typeface="Times New Roman" pitchFamily="18" charset="0"/>
+                <a:cs typeface="Times New Roman" pitchFamily="18" charset="0"/>
+              </a:rPr>
+              <a:t> </a:t>
+            </a:r>
+            <a:r>
+              <a:rPr lang="sv-SE" smtClean="0">
+                <a:latin typeface="Times New Roman" pitchFamily="18" charset="0"/>
+                <a:cs typeface="Times New Roman" pitchFamily="18" charset="0"/>
+              </a:rPr>
+              <a:t>enggunakan </a:t>
+            </a:r>
+            <a:r>
+              <a:rPr lang="sv-SE" smtClean="0">
+                <a:latin typeface="Times New Roman" pitchFamily="18" charset="0"/>
+                <a:cs typeface="Times New Roman" pitchFamily="18" charset="0"/>
+              </a:rPr>
+              <a:t>statement </a:t>
+            </a:r>
+            <a:r>
+              <a:rPr lang="sv-SE" smtClean="0">
+                <a:latin typeface="Times New Roman" pitchFamily="18" charset="0"/>
+                <a:cs typeface="Times New Roman" pitchFamily="18" charset="0"/>
+              </a:rPr>
+              <a:t>perulangan</a:t>
+            </a:r>
+            <a:r>
+              <a:rPr lang="id-ID" smtClean="0">
+                <a:latin typeface="Times New Roman" pitchFamily="18" charset="0"/>
+                <a:cs typeface="Times New Roman" pitchFamily="18" charset="0"/>
+              </a:rPr>
+              <a:t> for </a:t>
+            </a:r>
+            <a:r>
+              <a:rPr lang="id-ID" smtClean="0">
+                <a:latin typeface="Times New Roman" pitchFamily="18" charset="0"/>
+                <a:cs typeface="Times New Roman" pitchFamily="18" charset="0"/>
+              </a:rPr>
+              <a:t>di dalam statement perulangan while dan </a:t>
+            </a:r>
+            <a:r>
+              <a:rPr lang="id-ID" smtClean="0">
+                <a:latin typeface="Times New Roman" pitchFamily="18" charset="0"/>
+                <a:cs typeface="Times New Roman" pitchFamily="18" charset="0"/>
+              </a:rPr>
+              <a:t>juga </a:t>
+            </a:r>
+            <a:r>
+              <a:rPr lang="id-ID" smtClean="0">
+                <a:latin typeface="Times New Roman" pitchFamily="18" charset="0"/>
+                <a:cs typeface="Times New Roman" pitchFamily="18" charset="0"/>
+              </a:rPr>
+              <a:t>sebaliknya. </a:t>
+            </a:r>
             <a:endParaRPr lang="id-ID"/>
           </a:p>
         </p:txBody>
@@ -5801,10 +6049,6 @@
           <a:bodyPr/>
           <a:lstStyle/>
           <a:p>
-            <a:r>
-              <a:rPr lang="id-ID" smtClean="0"/>
-              <a:t>Latihan</a:t>
-            </a:r>
             <a:endParaRPr lang="id-ID"/>
           </a:p>
         </p:txBody>
@@ -5828,11 +6072,332 @@
           </a:p>
         </p:txBody>
       </p:sp>
+      <p:pic>
+        <p:nvPicPr>
+          <p:cNvPr id="1028" name="Picture 4"/>
+          <p:cNvPicPr>
+            <a:picLocks noChangeAspect="1" noChangeArrowheads="1"/>
+          </p:cNvPicPr>
+          <p:nvPr/>
+        </p:nvPicPr>
+        <p:blipFill>
+          <a:blip r:embed="rId2"/>
+          <a:srcRect/>
+          <a:stretch>
+            <a:fillRect/>
+          </a:stretch>
+        </p:blipFill>
+        <p:spPr bwMode="auto">
+          <a:xfrm>
+            <a:off x="1295400" y="762000"/>
+            <a:ext cx="6563660" cy="6096000"/>
+          </a:xfrm>
+          <a:prstGeom prst="rect">
+            <a:avLst/>
+          </a:prstGeom>
+          <a:ln>
+            <a:noFill/>
+          </a:ln>
+          <a:effectLst>
+            <a:outerShdw blurRad="292100" dist="139700" dir="2700000" algn="tl" rotWithShape="0">
+              <a:srgbClr val="333333">
+                <a:alpha val="65000"/>
+              </a:srgbClr>
+            </a:outerShdw>
+          </a:effectLst>
+        </p:spPr>
+      </p:pic>
+      <p:pic>
+        <p:nvPicPr>
+          <p:cNvPr id="1029" name="Picture 5"/>
+          <p:cNvPicPr>
+            <a:picLocks noChangeAspect="1" noChangeArrowheads="1"/>
+          </p:cNvPicPr>
+          <p:nvPr/>
+        </p:nvPicPr>
+        <p:blipFill>
+          <a:blip r:embed="rId3"/>
+          <a:srcRect r="7402" b="56835"/>
+          <a:stretch>
+            <a:fillRect/>
+          </a:stretch>
+        </p:blipFill>
+        <p:spPr bwMode="auto">
+          <a:xfrm>
+            <a:off x="1295400" y="533400"/>
+            <a:ext cx="6553200" cy="1143000"/>
+          </a:xfrm>
+          <a:prstGeom prst="rect">
+            <a:avLst/>
+          </a:prstGeom>
+          <a:noFill/>
+          <a:ln w="9525">
+            <a:noFill/>
+            <a:miter lim="800000"/>
+            <a:headEnd/>
+            <a:tailEnd/>
+          </a:ln>
+          <a:effectLst/>
+        </p:spPr>
+      </p:pic>
     </p:spTree>
   </p:cSld>
   <p:clrMapOvr>
     <a:masterClrMapping/>
   </p:clrMapOvr>
+  <p:timing>
+    <p:tnLst>
+      <p:par>
+        <p:cTn id="1" dur="indefinite" restart="never" nodeType="tmRoot"/>
+      </p:par>
+    </p:tnLst>
+  </p:timing>
+</p:sld>
+</file>
+
+<file path=ppt/slides/slide28.xml><?xml version="1.0" encoding="utf-8"?>
+<p:sld xmlns:a="http://schemas.openxmlformats.org/drawingml/2006/main" xmlns:r="http://schemas.openxmlformats.org/officeDocument/2006/relationships" xmlns:p="http://schemas.openxmlformats.org/presentationml/2006/main">
+  <p:cSld>
+    <p:spTree>
+      <p:nvGrpSpPr>
+        <p:cNvPr id="1" name=""/>
+        <p:cNvGrpSpPr/>
+        <p:nvPr/>
+      </p:nvGrpSpPr>
+      <p:grpSpPr>
+        <a:xfrm>
+          <a:off x="0" y="0"/>
+          <a:ext cx="0" cy="0"/>
+          <a:chOff x="0" y="0"/>
+          <a:chExt cx="0" cy="0"/>
+        </a:xfrm>
+      </p:grpSpPr>
+      <p:sp>
+        <p:nvSpPr>
+          <p:cNvPr id="2" name="Title 1"/>
+          <p:cNvSpPr>
+            <a:spLocks noGrp="1"/>
+          </p:cNvSpPr>
+          <p:nvPr>
+            <p:ph type="title"/>
+          </p:nvPr>
+        </p:nvSpPr>
+        <p:spPr/>
+        <p:txBody>
+          <a:bodyPr/>
+          <a:lstStyle/>
+          <a:p>
+            <a:endParaRPr lang="id-ID"/>
+          </a:p>
+        </p:txBody>
+      </p:sp>
+      <p:sp>
+        <p:nvSpPr>
+          <p:cNvPr id="3" name="Content Placeholder 2"/>
+          <p:cNvSpPr>
+            <a:spLocks noGrp="1"/>
+          </p:cNvSpPr>
+          <p:nvPr>
+            <p:ph idx="1"/>
+          </p:nvPr>
+        </p:nvSpPr>
+        <p:spPr/>
+        <p:txBody>
+          <a:bodyPr/>
+          <a:lstStyle/>
+          <a:p>
+            <a:endParaRPr lang="id-ID"/>
+          </a:p>
+        </p:txBody>
+      </p:sp>
+      <p:pic>
+        <p:nvPicPr>
+          <p:cNvPr id="2050" name="Picture 2"/>
+          <p:cNvPicPr>
+            <a:picLocks noChangeAspect="1" noChangeArrowheads="1"/>
+          </p:cNvPicPr>
+          <p:nvPr/>
+        </p:nvPicPr>
+        <p:blipFill>
+          <a:blip r:embed="rId2"/>
+          <a:srcRect/>
+          <a:stretch>
+            <a:fillRect/>
+          </a:stretch>
+        </p:blipFill>
+        <p:spPr bwMode="auto">
+          <a:xfrm>
+            <a:off x="666750" y="1595438"/>
+            <a:ext cx="7810500" cy="3667125"/>
+          </a:xfrm>
+          <a:prstGeom prst="rect">
+            <a:avLst/>
+          </a:prstGeom>
+          <a:ln>
+            <a:noFill/>
+          </a:ln>
+          <a:effectLst>
+            <a:outerShdw blurRad="292100" dist="139700" dir="2700000" algn="tl" rotWithShape="0">
+              <a:srgbClr val="333333">
+                <a:alpha val="65000"/>
+              </a:srgbClr>
+            </a:outerShdw>
+          </a:effectLst>
+        </p:spPr>
+      </p:pic>
+    </p:spTree>
+  </p:cSld>
+  <p:clrMapOvr>
+    <a:masterClrMapping/>
+  </p:clrMapOvr>
+</p:sld>
+</file>
+
+<file path=ppt/slides/slide29.xml><?xml version="1.0" encoding="utf-8"?>
+<p:sld xmlns:a="http://schemas.openxmlformats.org/drawingml/2006/main" xmlns:r="http://schemas.openxmlformats.org/officeDocument/2006/relationships" xmlns:p="http://schemas.openxmlformats.org/presentationml/2006/main">
+  <p:cSld>
+    <p:spTree>
+      <p:nvGrpSpPr>
+        <p:cNvPr id="1" name=""/>
+        <p:cNvGrpSpPr/>
+        <p:nvPr/>
+      </p:nvGrpSpPr>
+      <p:grpSpPr>
+        <a:xfrm>
+          <a:off x="0" y="0"/>
+          <a:ext cx="0" cy="0"/>
+          <a:chOff x="0" y="0"/>
+          <a:chExt cx="0" cy="0"/>
+        </a:xfrm>
+      </p:grpSpPr>
+      <p:sp>
+        <p:nvSpPr>
+          <p:cNvPr id="2" name="Title 1"/>
+          <p:cNvSpPr>
+            <a:spLocks noGrp="1"/>
+          </p:cNvSpPr>
+          <p:nvPr>
+            <p:ph type="title"/>
+          </p:nvPr>
+        </p:nvSpPr>
+        <p:spPr/>
+        <p:txBody>
+          <a:bodyPr/>
+          <a:lstStyle/>
+          <a:p>
+            <a:r>
+              <a:rPr lang="id-ID" smtClean="0">
+                <a:latin typeface="Times New Roman" pitchFamily="18" charset="0"/>
+                <a:cs typeface="Times New Roman" pitchFamily="18" charset="0"/>
+              </a:rPr>
+              <a:t>Latihan</a:t>
+            </a:r>
+            <a:endParaRPr lang="id-ID">
+              <a:latin typeface="Times New Roman" pitchFamily="18" charset="0"/>
+              <a:cs typeface="Times New Roman" pitchFamily="18" charset="0"/>
+            </a:endParaRPr>
+          </a:p>
+        </p:txBody>
+      </p:sp>
+      <p:sp>
+        <p:nvSpPr>
+          <p:cNvPr id="3" name="Content Placeholder 2"/>
+          <p:cNvSpPr>
+            <a:spLocks noGrp="1"/>
+          </p:cNvSpPr>
+          <p:nvPr>
+            <p:ph idx="1"/>
+          </p:nvPr>
+        </p:nvSpPr>
+        <p:spPr/>
+        <p:txBody>
+          <a:bodyPr/>
+          <a:lstStyle/>
+          <a:p>
+            <a:endParaRPr lang="id-ID"/>
+          </a:p>
+        </p:txBody>
+      </p:sp>
+      <p:pic>
+        <p:nvPicPr>
+          <p:cNvPr id="3075" name="Picture 3"/>
+          <p:cNvPicPr>
+            <a:picLocks noChangeAspect="1" noChangeArrowheads="1"/>
+          </p:cNvPicPr>
+          <p:nvPr/>
+        </p:nvPicPr>
+        <p:blipFill>
+          <a:blip r:embed="rId2"/>
+          <a:srcRect/>
+          <a:stretch>
+            <a:fillRect/>
+          </a:stretch>
+        </p:blipFill>
+        <p:spPr bwMode="auto">
+          <a:xfrm>
+            <a:off x="304800" y="1371600"/>
+            <a:ext cx="8439150" cy="3829050"/>
+          </a:xfrm>
+          <a:prstGeom prst="rect">
+            <a:avLst/>
+          </a:prstGeom>
+          <a:ln>
+            <a:noFill/>
+          </a:ln>
+          <a:effectLst>
+            <a:outerShdw blurRad="292100" dist="139700" dir="2700000" algn="tl" rotWithShape="0">
+              <a:srgbClr val="333333">
+                <a:alpha val="65000"/>
+              </a:srgbClr>
+            </a:outerShdw>
+          </a:effectLst>
+        </p:spPr>
+      </p:pic>
+      <p:pic>
+        <p:nvPicPr>
+          <p:cNvPr id="3076" name="Picture 4"/>
+          <p:cNvPicPr>
+            <a:picLocks noChangeAspect="1" noChangeArrowheads="1"/>
+          </p:cNvPicPr>
+          <p:nvPr/>
+        </p:nvPicPr>
+        <p:blipFill>
+          <a:blip r:embed="rId3"/>
+          <a:srcRect/>
+          <a:stretch>
+            <a:fillRect/>
+          </a:stretch>
+        </p:blipFill>
+        <p:spPr bwMode="auto">
+          <a:xfrm>
+            <a:off x="838200" y="3200400"/>
+            <a:ext cx="7724775" cy="1571625"/>
+          </a:xfrm>
+          <a:prstGeom prst="rect">
+            <a:avLst/>
+          </a:prstGeom>
+          <a:noFill/>
+          <a:ln w="9525">
+            <a:noFill/>
+            <a:miter lim="800000"/>
+            <a:headEnd/>
+            <a:tailEnd/>
+          </a:ln>
+          <a:effectLst/>
+        </p:spPr>
+      </p:pic>
+    </p:spTree>
+  </p:cSld>
+  <p:clrMapOvr>
+    <a:masterClrMapping/>
+  </p:clrMapOvr>
+  <p:timing>
+    <p:tnLst>
+      <p:par>
+        <p:cTn id="1" dur="indefinite" restart="never" nodeType="tmRoot"/>
+      </p:par>
+    </p:tnLst>
+  </p:timing>
 </p:sld>
 </file>
 
@@ -5940,6 +6505,471 @@
           </a:p>
         </p:txBody>
       </p:sp>
+    </p:spTree>
+  </p:cSld>
+  <p:clrMapOvr>
+    <a:masterClrMapping/>
+  </p:clrMapOvr>
+</p:sld>
+</file>
+
+<file path=ppt/slides/slide30.xml><?xml version="1.0" encoding="utf-8"?>
+<p:sld xmlns:a="http://schemas.openxmlformats.org/drawingml/2006/main" xmlns:r="http://schemas.openxmlformats.org/officeDocument/2006/relationships" xmlns:p="http://schemas.openxmlformats.org/presentationml/2006/main">
+  <p:cSld>
+    <p:spTree>
+      <p:nvGrpSpPr>
+        <p:cNvPr id="1" name=""/>
+        <p:cNvGrpSpPr/>
+        <p:nvPr/>
+      </p:nvGrpSpPr>
+      <p:grpSpPr>
+        <a:xfrm>
+          <a:off x="0" y="0"/>
+          <a:ext cx="0" cy="0"/>
+          <a:chOff x="0" y="0"/>
+          <a:chExt cx="0" cy="0"/>
+        </a:xfrm>
+      </p:grpSpPr>
+      <p:sp>
+        <p:nvSpPr>
+          <p:cNvPr id="2" name="Title 1"/>
+          <p:cNvSpPr>
+            <a:spLocks noGrp="1"/>
+          </p:cNvSpPr>
+          <p:nvPr>
+            <p:ph type="title"/>
+          </p:nvPr>
+        </p:nvSpPr>
+        <p:spPr/>
+        <p:txBody>
+          <a:bodyPr/>
+          <a:lstStyle/>
+          <a:p>
+            <a:endParaRPr lang="id-ID"/>
+          </a:p>
+        </p:txBody>
+      </p:sp>
+      <p:sp>
+        <p:nvSpPr>
+          <p:cNvPr id="3" name="Content Placeholder 2"/>
+          <p:cNvSpPr>
+            <a:spLocks noGrp="1"/>
+          </p:cNvSpPr>
+          <p:nvPr>
+            <p:ph idx="1"/>
+          </p:nvPr>
+        </p:nvSpPr>
+        <p:spPr/>
+        <p:txBody>
+          <a:bodyPr/>
+          <a:lstStyle/>
+          <a:p>
+            <a:endParaRPr lang="id-ID"/>
+          </a:p>
+        </p:txBody>
+      </p:sp>
+      <p:pic>
+        <p:nvPicPr>
+          <p:cNvPr id="4098" name="Picture 2"/>
+          <p:cNvPicPr>
+            <a:picLocks noChangeAspect="1" noChangeArrowheads="1"/>
+          </p:cNvPicPr>
+          <p:nvPr/>
+        </p:nvPicPr>
+        <p:blipFill>
+          <a:blip r:embed="rId2"/>
+          <a:srcRect b="62837"/>
+          <a:stretch>
+            <a:fillRect/>
+          </a:stretch>
+        </p:blipFill>
+        <p:spPr bwMode="auto">
+          <a:xfrm>
+            <a:off x="838200" y="457200"/>
+            <a:ext cx="7581900" cy="5638800"/>
+          </a:xfrm>
+          <a:prstGeom prst="rect">
+            <a:avLst/>
+          </a:prstGeom>
+          <a:ln>
+            <a:noFill/>
+          </a:ln>
+          <a:effectLst>
+            <a:outerShdw blurRad="292100" dist="139700" dir="2700000" algn="tl" rotWithShape="0">
+              <a:srgbClr val="333333">
+                <a:alpha val="65000"/>
+              </a:srgbClr>
+            </a:outerShdw>
+          </a:effectLst>
+        </p:spPr>
+      </p:pic>
+    </p:spTree>
+  </p:cSld>
+  <p:clrMapOvr>
+    <a:masterClrMapping/>
+  </p:clrMapOvr>
+</p:sld>
+</file>
+
+<file path=ppt/slides/slide31.xml><?xml version="1.0" encoding="utf-8"?>
+<p:sld xmlns:a="http://schemas.openxmlformats.org/drawingml/2006/main" xmlns:r="http://schemas.openxmlformats.org/officeDocument/2006/relationships" xmlns:p="http://schemas.openxmlformats.org/presentationml/2006/main">
+  <p:cSld>
+    <p:spTree>
+      <p:nvGrpSpPr>
+        <p:cNvPr id="1" name=""/>
+        <p:cNvGrpSpPr/>
+        <p:nvPr/>
+      </p:nvGrpSpPr>
+      <p:grpSpPr>
+        <a:xfrm>
+          <a:off x="0" y="0"/>
+          <a:ext cx="0" cy="0"/>
+          <a:chOff x="0" y="0"/>
+          <a:chExt cx="0" cy="0"/>
+        </a:xfrm>
+      </p:grpSpPr>
+      <p:sp>
+        <p:nvSpPr>
+          <p:cNvPr id="2" name="Title 1"/>
+          <p:cNvSpPr>
+            <a:spLocks noGrp="1"/>
+          </p:cNvSpPr>
+          <p:nvPr>
+            <p:ph type="title"/>
+          </p:nvPr>
+        </p:nvSpPr>
+        <p:spPr/>
+        <p:txBody>
+          <a:bodyPr/>
+          <a:lstStyle/>
+          <a:p>
+            <a:endParaRPr lang="id-ID"/>
+          </a:p>
+        </p:txBody>
+      </p:sp>
+      <p:sp>
+        <p:nvSpPr>
+          <p:cNvPr id="3" name="Content Placeholder 2"/>
+          <p:cNvSpPr>
+            <a:spLocks noGrp="1"/>
+          </p:cNvSpPr>
+          <p:nvPr>
+            <p:ph idx="1"/>
+          </p:nvPr>
+        </p:nvSpPr>
+        <p:spPr/>
+        <p:txBody>
+          <a:bodyPr/>
+          <a:lstStyle/>
+          <a:p>
+            <a:endParaRPr lang="id-ID"/>
+          </a:p>
+        </p:txBody>
+      </p:sp>
+      <p:pic>
+        <p:nvPicPr>
+          <p:cNvPr id="5123" name="Picture 3"/>
+          <p:cNvPicPr>
+            <a:picLocks noChangeAspect="1" noChangeArrowheads="1"/>
+          </p:cNvPicPr>
+          <p:nvPr/>
+        </p:nvPicPr>
+        <p:blipFill>
+          <a:blip r:embed="rId2"/>
+          <a:srcRect/>
+          <a:stretch>
+            <a:fillRect/>
+          </a:stretch>
+        </p:blipFill>
+        <p:spPr bwMode="auto">
+          <a:xfrm>
+            <a:off x="904875" y="23813"/>
+            <a:ext cx="7334250" cy="6810375"/>
+          </a:xfrm>
+          <a:prstGeom prst="rect">
+            <a:avLst/>
+          </a:prstGeom>
+          <a:ln>
+            <a:noFill/>
+          </a:ln>
+          <a:effectLst>
+            <a:outerShdw blurRad="292100" dist="139700" dir="2700000" algn="tl" rotWithShape="0">
+              <a:srgbClr val="333333">
+                <a:alpha val="65000"/>
+              </a:srgbClr>
+            </a:outerShdw>
+          </a:effectLst>
+        </p:spPr>
+      </p:pic>
+      <p:pic>
+        <p:nvPicPr>
+          <p:cNvPr id="5124" name="Picture 4"/>
+          <p:cNvPicPr>
+            <a:picLocks noChangeAspect="1" noChangeArrowheads="1"/>
+          </p:cNvPicPr>
+          <p:nvPr/>
+        </p:nvPicPr>
+        <p:blipFill>
+          <a:blip r:embed="rId3"/>
+          <a:srcRect/>
+          <a:stretch>
+            <a:fillRect/>
+          </a:stretch>
+        </p:blipFill>
+        <p:spPr bwMode="auto">
+          <a:xfrm>
+            <a:off x="3581400" y="914400"/>
+            <a:ext cx="4638675" cy="2476500"/>
+          </a:xfrm>
+          <a:prstGeom prst="rect">
+            <a:avLst/>
+          </a:prstGeom>
+          <a:noFill/>
+          <a:ln w="9525">
+            <a:noFill/>
+            <a:miter lim="800000"/>
+            <a:headEnd/>
+            <a:tailEnd/>
+          </a:ln>
+          <a:effectLst/>
+        </p:spPr>
+      </p:pic>
+      <p:pic>
+        <p:nvPicPr>
+          <p:cNvPr id="5126" name="Picture 6"/>
+          <p:cNvPicPr>
+            <a:picLocks noChangeAspect="1" noChangeArrowheads="1"/>
+          </p:cNvPicPr>
+          <p:nvPr/>
+        </p:nvPicPr>
+        <p:blipFill>
+          <a:blip r:embed="rId4"/>
+          <a:srcRect/>
+          <a:stretch>
+            <a:fillRect/>
+          </a:stretch>
+        </p:blipFill>
+        <p:spPr bwMode="auto">
+          <a:xfrm>
+            <a:off x="3581400" y="2971800"/>
+            <a:ext cx="4381500" cy="2895600"/>
+          </a:xfrm>
+          <a:prstGeom prst="rect">
+            <a:avLst/>
+          </a:prstGeom>
+          <a:noFill/>
+          <a:ln w="9525">
+            <a:noFill/>
+            <a:miter lim="800000"/>
+            <a:headEnd/>
+            <a:tailEnd/>
+          </a:ln>
+          <a:effectLst/>
+        </p:spPr>
+      </p:pic>
+    </p:spTree>
+  </p:cSld>
+  <p:clrMapOvr>
+    <a:masterClrMapping/>
+  </p:clrMapOvr>
+  <p:timing>
+    <p:tnLst>
+      <p:par>
+        <p:cTn id="1" dur="indefinite" restart="never" nodeType="tmRoot"/>
+      </p:par>
+    </p:tnLst>
+  </p:timing>
+</p:sld>
+</file>
+
+<file path=ppt/slides/slide32.xml><?xml version="1.0" encoding="utf-8"?>
+<p:sld xmlns:a="http://schemas.openxmlformats.org/drawingml/2006/main" xmlns:r="http://schemas.openxmlformats.org/officeDocument/2006/relationships" xmlns:p="http://schemas.openxmlformats.org/presentationml/2006/main">
+  <p:cSld>
+    <p:spTree>
+      <p:nvGrpSpPr>
+        <p:cNvPr id="1" name=""/>
+        <p:cNvGrpSpPr/>
+        <p:nvPr/>
+      </p:nvGrpSpPr>
+      <p:grpSpPr>
+        <a:xfrm>
+          <a:off x="0" y="0"/>
+          <a:ext cx="0" cy="0"/>
+          <a:chOff x="0" y="0"/>
+          <a:chExt cx="0" cy="0"/>
+        </a:xfrm>
+      </p:grpSpPr>
+      <p:sp>
+        <p:nvSpPr>
+          <p:cNvPr id="2" name="Title 1"/>
+          <p:cNvSpPr>
+            <a:spLocks noGrp="1"/>
+          </p:cNvSpPr>
+          <p:nvPr>
+            <p:ph type="title"/>
+          </p:nvPr>
+        </p:nvSpPr>
+        <p:spPr/>
+        <p:txBody>
+          <a:bodyPr/>
+          <a:lstStyle/>
+          <a:p>
+            <a:endParaRPr lang="id-ID"/>
+          </a:p>
+        </p:txBody>
+      </p:sp>
+      <p:sp>
+        <p:nvSpPr>
+          <p:cNvPr id="3" name="Content Placeholder 2"/>
+          <p:cNvSpPr>
+            <a:spLocks noGrp="1"/>
+          </p:cNvSpPr>
+          <p:nvPr>
+            <p:ph idx="1"/>
+          </p:nvPr>
+        </p:nvSpPr>
+        <p:spPr/>
+        <p:txBody>
+          <a:bodyPr/>
+          <a:lstStyle/>
+          <a:p>
+            <a:endParaRPr lang="id-ID"/>
+          </a:p>
+        </p:txBody>
+      </p:sp>
+      <p:pic>
+        <p:nvPicPr>
+          <p:cNvPr id="6146" name="Picture 2"/>
+          <p:cNvPicPr>
+            <a:picLocks noChangeAspect="1" noChangeArrowheads="1"/>
+          </p:cNvPicPr>
+          <p:nvPr/>
+        </p:nvPicPr>
+        <p:blipFill>
+          <a:blip r:embed="rId2"/>
+          <a:srcRect/>
+          <a:stretch>
+            <a:fillRect/>
+          </a:stretch>
+        </p:blipFill>
+        <p:spPr bwMode="auto">
+          <a:xfrm>
+            <a:off x="457200" y="1828800"/>
+            <a:ext cx="8324850" cy="3914775"/>
+          </a:xfrm>
+          <a:prstGeom prst="rect">
+            <a:avLst/>
+          </a:prstGeom>
+          <a:ln>
+            <a:noFill/>
+          </a:ln>
+          <a:effectLst>
+            <a:outerShdw blurRad="292100" dist="139700" dir="2700000" algn="tl" rotWithShape="0">
+              <a:srgbClr val="333333">
+                <a:alpha val="65000"/>
+              </a:srgbClr>
+            </a:outerShdw>
+          </a:effectLst>
+        </p:spPr>
+      </p:pic>
+    </p:spTree>
+  </p:cSld>
+  <p:clrMapOvr>
+    <a:masterClrMapping/>
+  </p:clrMapOvr>
+</p:sld>
+</file>
+
+<file path=ppt/slides/slide33.xml><?xml version="1.0" encoding="utf-8"?>
+<p:sld xmlns:a="http://schemas.openxmlformats.org/drawingml/2006/main" xmlns:r="http://schemas.openxmlformats.org/officeDocument/2006/relationships" xmlns:p="http://schemas.openxmlformats.org/presentationml/2006/main">
+  <p:cSld>
+    <p:spTree>
+      <p:nvGrpSpPr>
+        <p:cNvPr id="1" name=""/>
+        <p:cNvGrpSpPr/>
+        <p:nvPr/>
+      </p:nvGrpSpPr>
+      <p:grpSpPr>
+        <a:xfrm>
+          <a:off x="0" y="0"/>
+          <a:ext cx="0" cy="0"/>
+          <a:chOff x="0" y="0"/>
+          <a:chExt cx="0" cy="0"/>
+        </a:xfrm>
+      </p:grpSpPr>
+      <p:sp>
+        <p:nvSpPr>
+          <p:cNvPr id="2" name="Title 1"/>
+          <p:cNvSpPr>
+            <a:spLocks noGrp="1"/>
+          </p:cNvSpPr>
+          <p:nvPr>
+            <p:ph type="title"/>
+          </p:nvPr>
+        </p:nvSpPr>
+        <p:spPr/>
+        <p:txBody>
+          <a:bodyPr/>
+          <a:lstStyle/>
+          <a:p>
+            <a:endParaRPr lang="id-ID"/>
+          </a:p>
+        </p:txBody>
+      </p:sp>
+      <p:sp>
+        <p:nvSpPr>
+          <p:cNvPr id="3" name="Content Placeholder 2"/>
+          <p:cNvSpPr>
+            <a:spLocks noGrp="1"/>
+          </p:cNvSpPr>
+          <p:nvPr>
+            <p:ph idx="1"/>
+          </p:nvPr>
+        </p:nvSpPr>
+        <p:spPr/>
+        <p:txBody>
+          <a:bodyPr/>
+          <a:lstStyle/>
+          <a:p>
+            <a:endParaRPr lang="id-ID"/>
+          </a:p>
+        </p:txBody>
+      </p:sp>
+      <p:pic>
+        <p:nvPicPr>
+          <p:cNvPr id="7170" name="Picture 2"/>
+          <p:cNvPicPr>
+            <a:picLocks noChangeAspect="1" noChangeArrowheads="1"/>
+          </p:cNvPicPr>
+          <p:nvPr/>
+        </p:nvPicPr>
+        <p:blipFill>
+          <a:blip r:embed="rId2"/>
+          <a:srcRect/>
+          <a:stretch>
+            <a:fillRect/>
+          </a:stretch>
+        </p:blipFill>
+        <p:spPr bwMode="auto">
+          <a:xfrm>
+            <a:off x="500063" y="352425"/>
+            <a:ext cx="8143875" cy="6153150"/>
+          </a:xfrm>
+          <a:prstGeom prst="rect">
+            <a:avLst/>
+          </a:prstGeom>
+          <a:ln>
+            <a:noFill/>
+          </a:ln>
+          <a:effectLst>
+            <a:outerShdw blurRad="292100" dist="139700" dir="2700000" algn="tl" rotWithShape="0">
+              <a:srgbClr val="333333">
+                <a:alpha val="65000"/>
+              </a:srgbClr>
+            </a:outerShdw>
+          </a:effectLst>
+        </p:spPr>
+      </p:pic>
     </p:spTree>
   </p:cSld>
   <p:clrMapOvr>

</xml_diff>